<commit_message>
ISIS-1465: adds docs for simpleapp archetype
</commit_message>
<xml_diff>
--- a/adocs/documentation/src/main/asciidoc/guides/ugfun/images/getting-started/using-simple-app/structure/structure.pptx
+++ b/adocs/documentation/src/main/asciidoc/guides/ugfun/images/getting-started/using-simple-app/structure/structure.pptx
@@ -6,6 +6,7 @@
   </p:sldMasterIdLst>
   <p:sldIdLst>
     <p:sldId id="256" r:id="rId2"/>
+    <p:sldId id="257" r:id="rId3"/>
   </p:sldIdLst>
   <p:sldSz cx="12192000" cy="6858000"/>
   <p:notesSz cx="6858000" cy="9144000"/>
@@ -133,7 +134,7 @@
           <p:cNvPr id="2" name="Title 1">
             <a:extLst>
               <a:ext uri="{FF2B5EF4-FFF2-40B4-BE49-F238E27FC236}">
-                <a16:creationId xmlns:a16="http://schemas.microsoft.com/office/drawing/2014/main" id="{62B102BC-6FA6-454B-844D-9A8D6067C174}"/>
+                <a16:creationId xmlns="" xmlns:a16="http://schemas.microsoft.com/office/drawing/2014/main" id="{62B102BC-6FA6-454B-844D-9A8D6067C174}"/>
               </a:ext>
             </a:extLst>
           </p:cNvPr>
@@ -171,7 +172,7 @@
           <p:cNvPr id="3" name="Subtitle 2">
             <a:extLst>
               <a:ext uri="{FF2B5EF4-FFF2-40B4-BE49-F238E27FC236}">
-                <a16:creationId xmlns:a16="http://schemas.microsoft.com/office/drawing/2014/main" id="{CE9482B4-22D7-4F07-9D18-1873C229CE0C}"/>
+                <a16:creationId xmlns="" xmlns:a16="http://schemas.microsoft.com/office/drawing/2014/main" id="{CE9482B4-22D7-4F07-9D18-1873C229CE0C}"/>
               </a:ext>
             </a:extLst>
           </p:cNvPr>
@@ -242,7 +243,7 @@
           <p:cNvPr id="4" name="Date Placeholder 3">
             <a:extLst>
               <a:ext uri="{FF2B5EF4-FFF2-40B4-BE49-F238E27FC236}">
-                <a16:creationId xmlns:a16="http://schemas.microsoft.com/office/drawing/2014/main" id="{F81ACFCD-6F6E-4D8D-B8D5-27069A5BE6BB}"/>
+                <a16:creationId xmlns="" xmlns:a16="http://schemas.microsoft.com/office/drawing/2014/main" id="{F81ACFCD-6F6E-4D8D-B8D5-27069A5BE6BB}"/>
               </a:ext>
             </a:extLst>
           </p:cNvPr>
@@ -260,7 +261,7 @@
           <a:p>
             <a:fld id="{2541EE3F-6AD4-4E8F-BC62-646164BF1E62}" type="datetimeFigureOut">
               <a:rPr lang="en-GB" smtClean="0"/>
-              <a:t>09/10/2017</a:t>
+              <a:t>10/10/2017</a:t>
             </a:fld>
             <a:endParaRPr lang="en-GB"/>
           </a:p>
@@ -271,7 +272,7 @@
           <p:cNvPr id="5" name="Footer Placeholder 4">
             <a:extLst>
               <a:ext uri="{FF2B5EF4-FFF2-40B4-BE49-F238E27FC236}">
-                <a16:creationId xmlns:a16="http://schemas.microsoft.com/office/drawing/2014/main" id="{778E2028-C5B4-4CD3-813A-8CF364446A10}"/>
+                <a16:creationId xmlns="" xmlns:a16="http://schemas.microsoft.com/office/drawing/2014/main" id="{778E2028-C5B4-4CD3-813A-8CF364446A10}"/>
               </a:ext>
             </a:extLst>
           </p:cNvPr>
@@ -296,7 +297,7 @@
           <p:cNvPr id="6" name="Slide Number Placeholder 5">
             <a:extLst>
               <a:ext uri="{FF2B5EF4-FFF2-40B4-BE49-F238E27FC236}">
-                <a16:creationId xmlns:a16="http://schemas.microsoft.com/office/drawing/2014/main" id="{3CBA0F38-247A-4070-86BC-E71E1B5B65BA}"/>
+                <a16:creationId xmlns="" xmlns:a16="http://schemas.microsoft.com/office/drawing/2014/main" id="{3CBA0F38-247A-4070-86BC-E71E1B5B65BA}"/>
               </a:ext>
             </a:extLst>
           </p:cNvPr>
@@ -355,7 +356,7 @@
           <p:cNvPr id="2" name="Title 1">
             <a:extLst>
               <a:ext uri="{FF2B5EF4-FFF2-40B4-BE49-F238E27FC236}">
-                <a16:creationId xmlns:a16="http://schemas.microsoft.com/office/drawing/2014/main" id="{461759D3-EAF3-49F9-8153-C8AEC8FE9041}"/>
+                <a16:creationId xmlns="" xmlns:a16="http://schemas.microsoft.com/office/drawing/2014/main" id="{461759D3-EAF3-49F9-8153-C8AEC8FE9041}"/>
               </a:ext>
             </a:extLst>
           </p:cNvPr>
@@ -384,7 +385,7 @@
           <p:cNvPr id="3" name="Vertical Text Placeholder 2">
             <a:extLst>
               <a:ext uri="{FF2B5EF4-FFF2-40B4-BE49-F238E27FC236}">
-                <a16:creationId xmlns:a16="http://schemas.microsoft.com/office/drawing/2014/main" id="{75C1CD87-5AD4-4DE8-B5A1-41C80FFF5FC1}"/>
+                <a16:creationId xmlns="" xmlns:a16="http://schemas.microsoft.com/office/drawing/2014/main" id="{75C1CD87-5AD4-4DE8-B5A1-41C80FFF5FC1}"/>
               </a:ext>
             </a:extLst>
           </p:cNvPr>
@@ -442,7 +443,7 @@
           <p:cNvPr id="4" name="Date Placeholder 3">
             <a:extLst>
               <a:ext uri="{FF2B5EF4-FFF2-40B4-BE49-F238E27FC236}">
-                <a16:creationId xmlns:a16="http://schemas.microsoft.com/office/drawing/2014/main" id="{704AC281-3B52-4EF9-B533-EAA80428A348}"/>
+                <a16:creationId xmlns="" xmlns:a16="http://schemas.microsoft.com/office/drawing/2014/main" id="{704AC281-3B52-4EF9-B533-EAA80428A348}"/>
               </a:ext>
             </a:extLst>
           </p:cNvPr>
@@ -460,7 +461,7 @@
           <a:p>
             <a:fld id="{2541EE3F-6AD4-4E8F-BC62-646164BF1E62}" type="datetimeFigureOut">
               <a:rPr lang="en-GB" smtClean="0"/>
-              <a:t>09/10/2017</a:t>
+              <a:t>10/10/2017</a:t>
             </a:fld>
             <a:endParaRPr lang="en-GB"/>
           </a:p>
@@ -471,7 +472,7 @@
           <p:cNvPr id="5" name="Footer Placeholder 4">
             <a:extLst>
               <a:ext uri="{FF2B5EF4-FFF2-40B4-BE49-F238E27FC236}">
-                <a16:creationId xmlns:a16="http://schemas.microsoft.com/office/drawing/2014/main" id="{EE61FD95-51F3-42B7-AC5B-A92D8EDEED84}"/>
+                <a16:creationId xmlns="" xmlns:a16="http://schemas.microsoft.com/office/drawing/2014/main" id="{EE61FD95-51F3-42B7-AC5B-A92D8EDEED84}"/>
               </a:ext>
             </a:extLst>
           </p:cNvPr>
@@ -496,7 +497,7 @@
           <p:cNvPr id="6" name="Slide Number Placeholder 5">
             <a:extLst>
               <a:ext uri="{FF2B5EF4-FFF2-40B4-BE49-F238E27FC236}">
-                <a16:creationId xmlns:a16="http://schemas.microsoft.com/office/drawing/2014/main" id="{FBAE30C7-5D93-4257-BA7B-A7B153D393C6}"/>
+                <a16:creationId xmlns="" xmlns:a16="http://schemas.microsoft.com/office/drawing/2014/main" id="{FBAE30C7-5D93-4257-BA7B-A7B153D393C6}"/>
               </a:ext>
             </a:extLst>
           </p:cNvPr>
@@ -555,7 +556,7 @@
           <p:cNvPr id="2" name="Vertical Title 1">
             <a:extLst>
               <a:ext uri="{FF2B5EF4-FFF2-40B4-BE49-F238E27FC236}">
-                <a16:creationId xmlns:a16="http://schemas.microsoft.com/office/drawing/2014/main" id="{EE57FB9B-E15C-428B-AB23-56D1980F1CE3}"/>
+                <a16:creationId xmlns="" xmlns:a16="http://schemas.microsoft.com/office/drawing/2014/main" id="{EE57FB9B-E15C-428B-AB23-56D1980F1CE3}"/>
               </a:ext>
             </a:extLst>
           </p:cNvPr>
@@ -589,7 +590,7 @@
           <p:cNvPr id="3" name="Vertical Text Placeholder 2">
             <a:extLst>
               <a:ext uri="{FF2B5EF4-FFF2-40B4-BE49-F238E27FC236}">
-                <a16:creationId xmlns:a16="http://schemas.microsoft.com/office/drawing/2014/main" id="{0ABDAF10-0A0C-41E0-AC01-E8696CC9EB95}"/>
+                <a16:creationId xmlns="" xmlns:a16="http://schemas.microsoft.com/office/drawing/2014/main" id="{0ABDAF10-0A0C-41E0-AC01-E8696CC9EB95}"/>
               </a:ext>
             </a:extLst>
           </p:cNvPr>
@@ -652,7 +653,7 @@
           <p:cNvPr id="4" name="Date Placeholder 3">
             <a:extLst>
               <a:ext uri="{FF2B5EF4-FFF2-40B4-BE49-F238E27FC236}">
-                <a16:creationId xmlns:a16="http://schemas.microsoft.com/office/drawing/2014/main" id="{6E7EC35F-476F-4B62-BC73-A0B4A412AED6}"/>
+                <a16:creationId xmlns="" xmlns:a16="http://schemas.microsoft.com/office/drawing/2014/main" id="{6E7EC35F-476F-4B62-BC73-A0B4A412AED6}"/>
               </a:ext>
             </a:extLst>
           </p:cNvPr>
@@ -670,7 +671,7 @@
           <a:p>
             <a:fld id="{2541EE3F-6AD4-4E8F-BC62-646164BF1E62}" type="datetimeFigureOut">
               <a:rPr lang="en-GB" smtClean="0"/>
-              <a:t>09/10/2017</a:t>
+              <a:t>10/10/2017</a:t>
             </a:fld>
             <a:endParaRPr lang="en-GB"/>
           </a:p>
@@ -681,7 +682,7 @@
           <p:cNvPr id="5" name="Footer Placeholder 4">
             <a:extLst>
               <a:ext uri="{FF2B5EF4-FFF2-40B4-BE49-F238E27FC236}">
-                <a16:creationId xmlns:a16="http://schemas.microsoft.com/office/drawing/2014/main" id="{4FDFDE2D-3A06-4D48-90BC-CDD568F2D152}"/>
+                <a16:creationId xmlns="" xmlns:a16="http://schemas.microsoft.com/office/drawing/2014/main" id="{4FDFDE2D-3A06-4D48-90BC-CDD568F2D152}"/>
               </a:ext>
             </a:extLst>
           </p:cNvPr>
@@ -706,7 +707,7 @@
           <p:cNvPr id="6" name="Slide Number Placeholder 5">
             <a:extLst>
               <a:ext uri="{FF2B5EF4-FFF2-40B4-BE49-F238E27FC236}">
-                <a16:creationId xmlns:a16="http://schemas.microsoft.com/office/drawing/2014/main" id="{137A2C31-71D3-4EA0-AC7C-4D04D84C521D}"/>
+                <a16:creationId xmlns="" xmlns:a16="http://schemas.microsoft.com/office/drawing/2014/main" id="{137A2C31-71D3-4EA0-AC7C-4D04D84C521D}"/>
               </a:ext>
             </a:extLst>
           </p:cNvPr>
@@ -765,7 +766,7 @@
           <p:cNvPr id="2" name="Title 1">
             <a:extLst>
               <a:ext uri="{FF2B5EF4-FFF2-40B4-BE49-F238E27FC236}">
-                <a16:creationId xmlns:a16="http://schemas.microsoft.com/office/drawing/2014/main" id="{FFBB1170-0202-4759-ABB6-C934B76C9856}"/>
+                <a16:creationId xmlns="" xmlns:a16="http://schemas.microsoft.com/office/drawing/2014/main" id="{FFBB1170-0202-4759-ABB6-C934B76C9856}"/>
               </a:ext>
             </a:extLst>
           </p:cNvPr>
@@ -794,7 +795,7 @@
           <p:cNvPr id="3" name="Content Placeholder 2">
             <a:extLst>
               <a:ext uri="{FF2B5EF4-FFF2-40B4-BE49-F238E27FC236}">
-                <a16:creationId xmlns:a16="http://schemas.microsoft.com/office/drawing/2014/main" id="{38B1B32D-417E-447A-B0B2-4CA08E44B63E}"/>
+                <a16:creationId xmlns="" xmlns:a16="http://schemas.microsoft.com/office/drawing/2014/main" id="{38B1B32D-417E-447A-B0B2-4CA08E44B63E}"/>
               </a:ext>
             </a:extLst>
           </p:cNvPr>
@@ -852,7 +853,7 @@
           <p:cNvPr id="4" name="Date Placeholder 3">
             <a:extLst>
               <a:ext uri="{FF2B5EF4-FFF2-40B4-BE49-F238E27FC236}">
-                <a16:creationId xmlns:a16="http://schemas.microsoft.com/office/drawing/2014/main" id="{8A085C5B-789D-4D63-8960-D5A983F7085E}"/>
+                <a16:creationId xmlns="" xmlns:a16="http://schemas.microsoft.com/office/drawing/2014/main" id="{8A085C5B-789D-4D63-8960-D5A983F7085E}"/>
               </a:ext>
             </a:extLst>
           </p:cNvPr>
@@ -870,7 +871,7 @@
           <a:p>
             <a:fld id="{2541EE3F-6AD4-4E8F-BC62-646164BF1E62}" type="datetimeFigureOut">
               <a:rPr lang="en-GB" smtClean="0"/>
-              <a:t>09/10/2017</a:t>
+              <a:t>10/10/2017</a:t>
             </a:fld>
             <a:endParaRPr lang="en-GB"/>
           </a:p>
@@ -881,7 +882,7 @@
           <p:cNvPr id="5" name="Footer Placeholder 4">
             <a:extLst>
               <a:ext uri="{FF2B5EF4-FFF2-40B4-BE49-F238E27FC236}">
-                <a16:creationId xmlns:a16="http://schemas.microsoft.com/office/drawing/2014/main" id="{FC2D6A07-3E41-41AE-BE95-3516FF565E23}"/>
+                <a16:creationId xmlns="" xmlns:a16="http://schemas.microsoft.com/office/drawing/2014/main" id="{FC2D6A07-3E41-41AE-BE95-3516FF565E23}"/>
               </a:ext>
             </a:extLst>
           </p:cNvPr>
@@ -906,7 +907,7 @@
           <p:cNvPr id="6" name="Slide Number Placeholder 5">
             <a:extLst>
               <a:ext uri="{FF2B5EF4-FFF2-40B4-BE49-F238E27FC236}">
-                <a16:creationId xmlns:a16="http://schemas.microsoft.com/office/drawing/2014/main" id="{39A73A8B-581A-405A-8534-AA295B7BBDD5}"/>
+                <a16:creationId xmlns="" xmlns:a16="http://schemas.microsoft.com/office/drawing/2014/main" id="{39A73A8B-581A-405A-8534-AA295B7BBDD5}"/>
               </a:ext>
             </a:extLst>
           </p:cNvPr>
@@ -965,7 +966,7 @@
           <p:cNvPr id="2" name="Title 1">
             <a:extLst>
               <a:ext uri="{FF2B5EF4-FFF2-40B4-BE49-F238E27FC236}">
-                <a16:creationId xmlns:a16="http://schemas.microsoft.com/office/drawing/2014/main" id="{109ECD23-0E17-48AD-BD5E-5BB85AC023D5}"/>
+                <a16:creationId xmlns="" xmlns:a16="http://schemas.microsoft.com/office/drawing/2014/main" id="{109ECD23-0E17-48AD-BD5E-5BB85AC023D5}"/>
               </a:ext>
             </a:extLst>
           </p:cNvPr>
@@ -1003,7 +1004,7 @@
           <p:cNvPr id="3" name="Text Placeholder 2">
             <a:extLst>
               <a:ext uri="{FF2B5EF4-FFF2-40B4-BE49-F238E27FC236}">
-                <a16:creationId xmlns:a16="http://schemas.microsoft.com/office/drawing/2014/main" id="{ACF56F5D-A2F0-48AD-A89F-654563A53A33}"/>
+                <a16:creationId xmlns="" xmlns:a16="http://schemas.microsoft.com/office/drawing/2014/main" id="{ACF56F5D-A2F0-48AD-A89F-654563A53A33}"/>
               </a:ext>
             </a:extLst>
           </p:cNvPr>
@@ -1128,7 +1129,7 @@
           <p:cNvPr id="4" name="Date Placeholder 3">
             <a:extLst>
               <a:ext uri="{FF2B5EF4-FFF2-40B4-BE49-F238E27FC236}">
-                <a16:creationId xmlns:a16="http://schemas.microsoft.com/office/drawing/2014/main" id="{40494F52-AC83-4213-A9C5-0703926CF973}"/>
+                <a16:creationId xmlns="" xmlns:a16="http://schemas.microsoft.com/office/drawing/2014/main" id="{40494F52-AC83-4213-A9C5-0703926CF973}"/>
               </a:ext>
             </a:extLst>
           </p:cNvPr>
@@ -1146,7 +1147,7 @@
           <a:p>
             <a:fld id="{2541EE3F-6AD4-4E8F-BC62-646164BF1E62}" type="datetimeFigureOut">
               <a:rPr lang="en-GB" smtClean="0"/>
-              <a:t>09/10/2017</a:t>
+              <a:t>10/10/2017</a:t>
             </a:fld>
             <a:endParaRPr lang="en-GB"/>
           </a:p>
@@ -1157,7 +1158,7 @@
           <p:cNvPr id="5" name="Footer Placeholder 4">
             <a:extLst>
               <a:ext uri="{FF2B5EF4-FFF2-40B4-BE49-F238E27FC236}">
-                <a16:creationId xmlns:a16="http://schemas.microsoft.com/office/drawing/2014/main" id="{EB74C0DA-70A8-42A1-8A8D-95FAFE41F087}"/>
+                <a16:creationId xmlns="" xmlns:a16="http://schemas.microsoft.com/office/drawing/2014/main" id="{EB74C0DA-70A8-42A1-8A8D-95FAFE41F087}"/>
               </a:ext>
             </a:extLst>
           </p:cNvPr>
@@ -1182,7 +1183,7 @@
           <p:cNvPr id="6" name="Slide Number Placeholder 5">
             <a:extLst>
               <a:ext uri="{FF2B5EF4-FFF2-40B4-BE49-F238E27FC236}">
-                <a16:creationId xmlns:a16="http://schemas.microsoft.com/office/drawing/2014/main" id="{C411F150-B828-4A46-B99F-DBAB30A031A5}"/>
+                <a16:creationId xmlns="" xmlns:a16="http://schemas.microsoft.com/office/drawing/2014/main" id="{C411F150-B828-4A46-B99F-DBAB30A031A5}"/>
               </a:ext>
             </a:extLst>
           </p:cNvPr>
@@ -1241,7 +1242,7 @@
           <p:cNvPr id="2" name="Title 1">
             <a:extLst>
               <a:ext uri="{FF2B5EF4-FFF2-40B4-BE49-F238E27FC236}">
-                <a16:creationId xmlns:a16="http://schemas.microsoft.com/office/drawing/2014/main" id="{31892941-0FB2-403B-8E26-01E05B8FCF45}"/>
+                <a16:creationId xmlns="" xmlns:a16="http://schemas.microsoft.com/office/drawing/2014/main" id="{31892941-0FB2-403B-8E26-01E05B8FCF45}"/>
               </a:ext>
             </a:extLst>
           </p:cNvPr>
@@ -1270,7 +1271,7 @@
           <p:cNvPr id="3" name="Content Placeholder 2">
             <a:extLst>
               <a:ext uri="{FF2B5EF4-FFF2-40B4-BE49-F238E27FC236}">
-                <a16:creationId xmlns:a16="http://schemas.microsoft.com/office/drawing/2014/main" id="{7110F9BB-217B-4355-AD22-D89B5E3B0E41}"/>
+                <a16:creationId xmlns="" xmlns:a16="http://schemas.microsoft.com/office/drawing/2014/main" id="{7110F9BB-217B-4355-AD22-D89B5E3B0E41}"/>
               </a:ext>
             </a:extLst>
           </p:cNvPr>
@@ -1333,7 +1334,7 @@
           <p:cNvPr id="4" name="Content Placeholder 3">
             <a:extLst>
               <a:ext uri="{FF2B5EF4-FFF2-40B4-BE49-F238E27FC236}">
-                <a16:creationId xmlns:a16="http://schemas.microsoft.com/office/drawing/2014/main" id="{7488FFE0-B9A9-449A-8309-DFCA37FF2BC7}"/>
+                <a16:creationId xmlns="" xmlns:a16="http://schemas.microsoft.com/office/drawing/2014/main" id="{7488FFE0-B9A9-449A-8309-DFCA37FF2BC7}"/>
               </a:ext>
             </a:extLst>
           </p:cNvPr>
@@ -1396,7 +1397,7 @@
           <p:cNvPr id="5" name="Date Placeholder 4">
             <a:extLst>
               <a:ext uri="{FF2B5EF4-FFF2-40B4-BE49-F238E27FC236}">
-                <a16:creationId xmlns:a16="http://schemas.microsoft.com/office/drawing/2014/main" id="{A2B882AB-1FE8-4B02-ACA9-35024EA65172}"/>
+                <a16:creationId xmlns="" xmlns:a16="http://schemas.microsoft.com/office/drawing/2014/main" id="{A2B882AB-1FE8-4B02-ACA9-35024EA65172}"/>
               </a:ext>
             </a:extLst>
           </p:cNvPr>
@@ -1414,7 +1415,7 @@
           <a:p>
             <a:fld id="{2541EE3F-6AD4-4E8F-BC62-646164BF1E62}" type="datetimeFigureOut">
               <a:rPr lang="en-GB" smtClean="0"/>
-              <a:t>09/10/2017</a:t>
+              <a:t>10/10/2017</a:t>
             </a:fld>
             <a:endParaRPr lang="en-GB"/>
           </a:p>
@@ -1425,7 +1426,7 @@
           <p:cNvPr id="6" name="Footer Placeholder 5">
             <a:extLst>
               <a:ext uri="{FF2B5EF4-FFF2-40B4-BE49-F238E27FC236}">
-                <a16:creationId xmlns:a16="http://schemas.microsoft.com/office/drawing/2014/main" id="{EB47F147-6BC6-43C9-B7B7-F97BDDAA4B74}"/>
+                <a16:creationId xmlns="" xmlns:a16="http://schemas.microsoft.com/office/drawing/2014/main" id="{EB47F147-6BC6-43C9-B7B7-F97BDDAA4B74}"/>
               </a:ext>
             </a:extLst>
           </p:cNvPr>
@@ -1450,7 +1451,7 @@
           <p:cNvPr id="7" name="Slide Number Placeholder 6">
             <a:extLst>
               <a:ext uri="{FF2B5EF4-FFF2-40B4-BE49-F238E27FC236}">
-                <a16:creationId xmlns:a16="http://schemas.microsoft.com/office/drawing/2014/main" id="{E6A5FB53-416E-4024-881B-F5C29D054044}"/>
+                <a16:creationId xmlns="" xmlns:a16="http://schemas.microsoft.com/office/drawing/2014/main" id="{E6A5FB53-416E-4024-881B-F5C29D054044}"/>
               </a:ext>
             </a:extLst>
           </p:cNvPr>
@@ -1509,7 +1510,7 @@
           <p:cNvPr id="2" name="Title 1">
             <a:extLst>
               <a:ext uri="{FF2B5EF4-FFF2-40B4-BE49-F238E27FC236}">
-                <a16:creationId xmlns:a16="http://schemas.microsoft.com/office/drawing/2014/main" id="{7D42A682-9F85-4356-B48A-CE092679BA04}"/>
+                <a16:creationId xmlns="" xmlns:a16="http://schemas.microsoft.com/office/drawing/2014/main" id="{7D42A682-9F85-4356-B48A-CE092679BA04}"/>
               </a:ext>
             </a:extLst>
           </p:cNvPr>
@@ -1543,7 +1544,7 @@
           <p:cNvPr id="3" name="Text Placeholder 2">
             <a:extLst>
               <a:ext uri="{FF2B5EF4-FFF2-40B4-BE49-F238E27FC236}">
-                <a16:creationId xmlns:a16="http://schemas.microsoft.com/office/drawing/2014/main" id="{93A100C7-1551-4643-9474-BA18A2D34C5C}"/>
+                <a16:creationId xmlns="" xmlns:a16="http://schemas.microsoft.com/office/drawing/2014/main" id="{93A100C7-1551-4643-9474-BA18A2D34C5C}"/>
               </a:ext>
             </a:extLst>
           </p:cNvPr>
@@ -1614,7 +1615,7 @@
           <p:cNvPr id="4" name="Content Placeholder 3">
             <a:extLst>
               <a:ext uri="{FF2B5EF4-FFF2-40B4-BE49-F238E27FC236}">
-                <a16:creationId xmlns:a16="http://schemas.microsoft.com/office/drawing/2014/main" id="{00DF2822-D48C-45FE-A0F0-513D0EB6AC60}"/>
+                <a16:creationId xmlns="" xmlns:a16="http://schemas.microsoft.com/office/drawing/2014/main" id="{00DF2822-D48C-45FE-A0F0-513D0EB6AC60}"/>
               </a:ext>
             </a:extLst>
           </p:cNvPr>
@@ -1677,7 +1678,7 @@
           <p:cNvPr id="5" name="Text Placeholder 4">
             <a:extLst>
               <a:ext uri="{FF2B5EF4-FFF2-40B4-BE49-F238E27FC236}">
-                <a16:creationId xmlns:a16="http://schemas.microsoft.com/office/drawing/2014/main" id="{CD1AF6EF-F8D3-4F66-9012-5FEEEF7F0F55}"/>
+                <a16:creationId xmlns="" xmlns:a16="http://schemas.microsoft.com/office/drawing/2014/main" id="{CD1AF6EF-F8D3-4F66-9012-5FEEEF7F0F55}"/>
               </a:ext>
             </a:extLst>
           </p:cNvPr>
@@ -1748,7 +1749,7 @@
           <p:cNvPr id="6" name="Content Placeholder 5">
             <a:extLst>
               <a:ext uri="{FF2B5EF4-FFF2-40B4-BE49-F238E27FC236}">
-                <a16:creationId xmlns:a16="http://schemas.microsoft.com/office/drawing/2014/main" id="{997211BD-9793-4486-811B-023D3B4F0C4D}"/>
+                <a16:creationId xmlns="" xmlns:a16="http://schemas.microsoft.com/office/drawing/2014/main" id="{997211BD-9793-4486-811B-023D3B4F0C4D}"/>
               </a:ext>
             </a:extLst>
           </p:cNvPr>
@@ -1811,7 +1812,7 @@
           <p:cNvPr id="7" name="Date Placeholder 6">
             <a:extLst>
               <a:ext uri="{FF2B5EF4-FFF2-40B4-BE49-F238E27FC236}">
-                <a16:creationId xmlns:a16="http://schemas.microsoft.com/office/drawing/2014/main" id="{EDC3839C-2291-47EE-99C3-DA4F0251D05D}"/>
+                <a16:creationId xmlns="" xmlns:a16="http://schemas.microsoft.com/office/drawing/2014/main" id="{EDC3839C-2291-47EE-99C3-DA4F0251D05D}"/>
               </a:ext>
             </a:extLst>
           </p:cNvPr>
@@ -1829,7 +1830,7 @@
           <a:p>
             <a:fld id="{2541EE3F-6AD4-4E8F-BC62-646164BF1E62}" type="datetimeFigureOut">
               <a:rPr lang="en-GB" smtClean="0"/>
-              <a:t>09/10/2017</a:t>
+              <a:t>10/10/2017</a:t>
             </a:fld>
             <a:endParaRPr lang="en-GB"/>
           </a:p>
@@ -1840,7 +1841,7 @@
           <p:cNvPr id="8" name="Footer Placeholder 7">
             <a:extLst>
               <a:ext uri="{FF2B5EF4-FFF2-40B4-BE49-F238E27FC236}">
-                <a16:creationId xmlns:a16="http://schemas.microsoft.com/office/drawing/2014/main" id="{7B69E267-1B93-4AAA-A1FF-6A6C1073322B}"/>
+                <a16:creationId xmlns="" xmlns:a16="http://schemas.microsoft.com/office/drawing/2014/main" id="{7B69E267-1B93-4AAA-A1FF-6A6C1073322B}"/>
               </a:ext>
             </a:extLst>
           </p:cNvPr>
@@ -1865,7 +1866,7 @@
           <p:cNvPr id="9" name="Slide Number Placeholder 8">
             <a:extLst>
               <a:ext uri="{FF2B5EF4-FFF2-40B4-BE49-F238E27FC236}">
-                <a16:creationId xmlns:a16="http://schemas.microsoft.com/office/drawing/2014/main" id="{8B804A2E-EB27-4440-AD36-BC5A69A0932E}"/>
+                <a16:creationId xmlns="" xmlns:a16="http://schemas.microsoft.com/office/drawing/2014/main" id="{8B804A2E-EB27-4440-AD36-BC5A69A0932E}"/>
               </a:ext>
             </a:extLst>
           </p:cNvPr>
@@ -1924,7 +1925,7 @@
           <p:cNvPr id="2" name="Title 1">
             <a:extLst>
               <a:ext uri="{FF2B5EF4-FFF2-40B4-BE49-F238E27FC236}">
-                <a16:creationId xmlns:a16="http://schemas.microsoft.com/office/drawing/2014/main" id="{565A87B0-B8F7-4B85-9E37-E5CB9D1E3686}"/>
+                <a16:creationId xmlns="" xmlns:a16="http://schemas.microsoft.com/office/drawing/2014/main" id="{565A87B0-B8F7-4B85-9E37-E5CB9D1E3686}"/>
               </a:ext>
             </a:extLst>
           </p:cNvPr>
@@ -1953,7 +1954,7 @@
           <p:cNvPr id="3" name="Date Placeholder 2">
             <a:extLst>
               <a:ext uri="{FF2B5EF4-FFF2-40B4-BE49-F238E27FC236}">
-                <a16:creationId xmlns:a16="http://schemas.microsoft.com/office/drawing/2014/main" id="{74BCE67F-BBD9-4A56-A930-D722FD351B98}"/>
+                <a16:creationId xmlns="" xmlns:a16="http://schemas.microsoft.com/office/drawing/2014/main" id="{74BCE67F-BBD9-4A56-A930-D722FD351B98}"/>
               </a:ext>
             </a:extLst>
           </p:cNvPr>
@@ -1971,7 +1972,7 @@
           <a:p>
             <a:fld id="{2541EE3F-6AD4-4E8F-BC62-646164BF1E62}" type="datetimeFigureOut">
               <a:rPr lang="en-GB" smtClean="0"/>
-              <a:t>09/10/2017</a:t>
+              <a:t>10/10/2017</a:t>
             </a:fld>
             <a:endParaRPr lang="en-GB"/>
           </a:p>
@@ -1982,7 +1983,7 @@
           <p:cNvPr id="4" name="Footer Placeholder 3">
             <a:extLst>
               <a:ext uri="{FF2B5EF4-FFF2-40B4-BE49-F238E27FC236}">
-                <a16:creationId xmlns:a16="http://schemas.microsoft.com/office/drawing/2014/main" id="{182E8441-453B-423D-B4A4-4824B6E6694D}"/>
+                <a16:creationId xmlns="" xmlns:a16="http://schemas.microsoft.com/office/drawing/2014/main" id="{182E8441-453B-423D-B4A4-4824B6E6694D}"/>
               </a:ext>
             </a:extLst>
           </p:cNvPr>
@@ -2007,7 +2008,7 @@
           <p:cNvPr id="5" name="Slide Number Placeholder 4">
             <a:extLst>
               <a:ext uri="{FF2B5EF4-FFF2-40B4-BE49-F238E27FC236}">
-                <a16:creationId xmlns:a16="http://schemas.microsoft.com/office/drawing/2014/main" id="{FE7954F9-3A3A-4E34-829F-59E25B1B87E9}"/>
+                <a16:creationId xmlns="" xmlns:a16="http://schemas.microsoft.com/office/drawing/2014/main" id="{FE7954F9-3A3A-4E34-829F-59E25B1B87E9}"/>
               </a:ext>
             </a:extLst>
           </p:cNvPr>
@@ -2066,7 +2067,7 @@
           <p:cNvPr id="2" name="Date Placeholder 1">
             <a:extLst>
               <a:ext uri="{FF2B5EF4-FFF2-40B4-BE49-F238E27FC236}">
-                <a16:creationId xmlns:a16="http://schemas.microsoft.com/office/drawing/2014/main" id="{D90E8004-A81D-4043-A138-3052B879B38B}"/>
+                <a16:creationId xmlns="" xmlns:a16="http://schemas.microsoft.com/office/drawing/2014/main" id="{D90E8004-A81D-4043-A138-3052B879B38B}"/>
               </a:ext>
             </a:extLst>
           </p:cNvPr>
@@ -2084,7 +2085,7 @@
           <a:p>
             <a:fld id="{2541EE3F-6AD4-4E8F-BC62-646164BF1E62}" type="datetimeFigureOut">
               <a:rPr lang="en-GB" smtClean="0"/>
-              <a:t>09/10/2017</a:t>
+              <a:t>10/10/2017</a:t>
             </a:fld>
             <a:endParaRPr lang="en-GB"/>
           </a:p>
@@ -2095,7 +2096,7 @@
           <p:cNvPr id="3" name="Footer Placeholder 2">
             <a:extLst>
               <a:ext uri="{FF2B5EF4-FFF2-40B4-BE49-F238E27FC236}">
-                <a16:creationId xmlns:a16="http://schemas.microsoft.com/office/drawing/2014/main" id="{4213D78E-7DCE-4335-BD93-4FABDFA9028D}"/>
+                <a16:creationId xmlns="" xmlns:a16="http://schemas.microsoft.com/office/drawing/2014/main" id="{4213D78E-7DCE-4335-BD93-4FABDFA9028D}"/>
               </a:ext>
             </a:extLst>
           </p:cNvPr>
@@ -2120,7 +2121,7 @@
           <p:cNvPr id="4" name="Slide Number Placeholder 3">
             <a:extLst>
               <a:ext uri="{FF2B5EF4-FFF2-40B4-BE49-F238E27FC236}">
-                <a16:creationId xmlns:a16="http://schemas.microsoft.com/office/drawing/2014/main" id="{4B7107D5-4ADF-446E-89E9-12677649CB32}"/>
+                <a16:creationId xmlns="" xmlns:a16="http://schemas.microsoft.com/office/drawing/2014/main" id="{4B7107D5-4ADF-446E-89E9-12677649CB32}"/>
               </a:ext>
             </a:extLst>
           </p:cNvPr>
@@ -2179,7 +2180,7 @@
           <p:cNvPr id="2" name="Title 1">
             <a:extLst>
               <a:ext uri="{FF2B5EF4-FFF2-40B4-BE49-F238E27FC236}">
-                <a16:creationId xmlns:a16="http://schemas.microsoft.com/office/drawing/2014/main" id="{A312E35F-E399-4563-974A-C28A3A5A7B92}"/>
+                <a16:creationId xmlns="" xmlns:a16="http://schemas.microsoft.com/office/drawing/2014/main" id="{A312E35F-E399-4563-974A-C28A3A5A7B92}"/>
               </a:ext>
             </a:extLst>
           </p:cNvPr>
@@ -2217,7 +2218,7 @@
           <p:cNvPr id="3" name="Content Placeholder 2">
             <a:extLst>
               <a:ext uri="{FF2B5EF4-FFF2-40B4-BE49-F238E27FC236}">
-                <a16:creationId xmlns:a16="http://schemas.microsoft.com/office/drawing/2014/main" id="{150281FF-602D-4A52-B49D-3A8854C4858E}"/>
+                <a16:creationId xmlns="" xmlns:a16="http://schemas.microsoft.com/office/drawing/2014/main" id="{150281FF-602D-4A52-B49D-3A8854C4858E}"/>
               </a:ext>
             </a:extLst>
           </p:cNvPr>
@@ -2308,7 +2309,7 @@
           <p:cNvPr id="4" name="Text Placeholder 3">
             <a:extLst>
               <a:ext uri="{FF2B5EF4-FFF2-40B4-BE49-F238E27FC236}">
-                <a16:creationId xmlns:a16="http://schemas.microsoft.com/office/drawing/2014/main" id="{DC9B3906-5426-4A54-A01D-51CBAF2A97EE}"/>
+                <a16:creationId xmlns="" xmlns:a16="http://schemas.microsoft.com/office/drawing/2014/main" id="{DC9B3906-5426-4A54-A01D-51CBAF2A97EE}"/>
               </a:ext>
             </a:extLst>
           </p:cNvPr>
@@ -2379,7 +2380,7 @@
           <p:cNvPr id="5" name="Date Placeholder 4">
             <a:extLst>
               <a:ext uri="{FF2B5EF4-FFF2-40B4-BE49-F238E27FC236}">
-                <a16:creationId xmlns:a16="http://schemas.microsoft.com/office/drawing/2014/main" id="{CD33EFE3-264C-4DB5-8E9A-5E021AA13842}"/>
+                <a16:creationId xmlns="" xmlns:a16="http://schemas.microsoft.com/office/drawing/2014/main" id="{CD33EFE3-264C-4DB5-8E9A-5E021AA13842}"/>
               </a:ext>
             </a:extLst>
           </p:cNvPr>
@@ -2397,7 +2398,7 @@
           <a:p>
             <a:fld id="{2541EE3F-6AD4-4E8F-BC62-646164BF1E62}" type="datetimeFigureOut">
               <a:rPr lang="en-GB" smtClean="0"/>
-              <a:t>09/10/2017</a:t>
+              <a:t>10/10/2017</a:t>
             </a:fld>
             <a:endParaRPr lang="en-GB"/>
           </a:p>
@@ -2408,7 +2409,7 @@
           <p:cNvPr id="6" name="Footer Placeholder 5">
             <a:extLst>
               <a:ext uri="{FF2B5EF4-FFF2-40B4-BE49-F238E27FC236}">
-                <a16:creationId xmlns:a16="http://schemas.microsoft.com/office/drawing/2014/main" id="{08D36B60-8054-4EE4-967E-5B7171E9EFB2}"/>
+                <a16:creationId xmlns="" xmlns:a16="http://schemas.microsoft.com/office/drawing/2014/main" id="{08D36B60-8054-4EE4-967E-5B7171E9EFB2}"/>
               </a:ext>
             </a:extLst>
           </p:cNvPr>
@@ -2433,7 +2434,7 @@
           <p:cNvPr id="7" name="Slide Number Placeholder 6">
             <a:extLst>
               <a:ext uri="{FF2B5EF4-FFF2-40B4-BE49-F238E27FC236}">
-                <a16:creationId xmlns:a16="http://schemas.microsoft.com/office/drawing/2014/main" id="{26180D1B-3814-41BB-82B0-52906EF80C70}"/>
+                <a16:creationId xmlns="" xmlns:a16="http://schemas.microsoft.com/office/drawing/2014/main" id="{26180D1B-3814-41BB-82B0-52906EF80C70}"/>
               </a:ext>
             </a:extLst>
           </p:cNvPr>
@@ -2492,7 +2493,7 @@
           <p:cNvPr id="2" name="Title 1">
             <a:extLst>
               <a:ext uri="{FF2B5EF4-FFF2-40B4-BE49-F238E27FC236}">
-                <a16:creationId xmlns:a16="http://schemas.microsoft.com/office/drawing/2014/main" id="{C151018B-FC83-4CA0-A29D-8B339030E57D}"/>
+                <a16:creationId xmlns="" xmlns:a16="http://schemas.microsoft.com/office/drawing/2014/main" id="{C151018B-FC83-4CA0-A29D-8B339030E57D}"/>
               </a:ext>
             </a:extLst>
           </p:cNvPr>
@@ -2530,7 +2531,7 @@
           <p:cNvPr id="3" name="Picture Placeholder 2">
             <a:extLst>
               <a:ext uri="{FF2B5EF4-FFF2-40B4-BE49-F238E27FC236}">
-                <a16:creationId xmlns:a16="http://schemas.microsoft.com/office/drawing/2014/main" id="{F9847BFC-6983-4D66-A419-486EE92FB050}"/>
+                <a16:creationId xmlns="" xmlns:a16="http://schemas.microsoft.com/office/drawing/2014/main" id="{F9847BFC-6983-4D66-A419-486EE92FB050}"/>
               </a:ext>
             </a:extLst>
           </p:cNvPr>
@@ -2597,7 +2598,7 @@
           <p:cNvPr id="4" name="Text Placeholder 3">
             <a:extLst>
               <a:ext uri="{FF2B5EF4-FFF2-40B4-BE49-F238E27FC236}">
-                <a16:creationId xmlns:a16="http://schemas.microsoft.com/office/drawing/2014/main" id="{C7BAFDFD-FA24-4919-A0B2-E34E42B907A9}"/>
+                <a16:creationId xmlns="" xmlns:a16="http://schemas.microsoft.com/office/drawing/2014/main" id="{C7BAFDFD-FA24-4919-A0B2-E34E42B907A9}"/>
               </a:ext>
             </a:extLst>
           </p:cNvPr>
@@ -2668,7 +2669,7 @@
           <p:cNvPr id="5" name="Date Placeholder 4">
             <a:extLst>
               <a:ext uri="{FF2B5EF4-FFF2-40B4-BE49-F238E27FC236}">
-                <a16:creationId xmlns:a16="http://schemas.microsoft.com/office/drawing/2014/main" id="{16556BCA-CD2D-4760-A27F-DF7BE2FD2705}"/>
+                <a16:creationId xmlns="" xmlns:a16="http://schemas.microsoft.com/office/drawing/2014/main" id="{16556BCA-CD2D-4760-A27F-DF7BE2FD2705}"/>
               </a:ext>
             </a:extLst>
           </p:cNvPr>
@@ -2686,7 +2687,7 @@
           <a:p>
             <a:fld id="{2541EE3F-6AD4-4E8F-BC62-646164BF1E62}" type="datetimeFigureOut">
               <a:rPr lang="en-GB" smtClean="0"/>
-              <a:t>09/10/2017</a:t>
+              <a:t>10/10/2017</a:t>
             </a:fld>
             <a:endParaRPr lang="en-GB"/>
           </a:p>
@@ -2697,7 +2698,7 @@
           <p:cNvPr id="6" name="Footer Placeholder 5">
             <a:extLst>
               <a:ext uri="{FF2B5EF4-FFF2-40B4-BE49-F238E27FC236}">
-                <a16:creationId xmlns:a16="http://schemas.microsoft.com/office/drawing/2014/main" id="{498140C2-3B9C-484F-810C-1A1CB9A81A62}"/>
+                <a16:creationId xmlns="" xmlns:a16="http://schemas.microsoft.com/office/drawing/2014/main" id="{498140C2-3B9C-484F-810C-1A1CB9A81A62}"/>
               </a:ext>
             </a:extLst>
           </p:cNvPr>
@@ -2722,7 +2723,7 @@
           <p:cNvPr id="7" name="Slide Number Placeholder 6">
             <a:extLst>
               <a:ext uri="{FF2B5EF4-FFF2-40B4-BE49-F238E27FC236}">
-                <a16:creationId xmlns:a16="http://schemas.microsoft.com/office/drawing/2014/main" id="{C626655F-CF6A-4D3A-9462-8FC1F0BDE57D}"/>
+                <a16:creationId xmlns="" xmlns:a16="http://schemas.microsoft.com/office/drawing/2014/main" id="{C626655F-CF6A-4D3A-9462-8FC1F0BDE57D}"/>
               </a:ext>
             </a:extLst>
           </p:cNvPr>
@@ -2786,7 +2787,7 @@
           <p:cNvPr id="2" name="Title Placeholder 1">
             <a:extLst>
               <a:ext uri="{FF2B5EF4-FFF2-40B4-BE49-F238E27FC236}">
-                <a16:creationId xmlns:a16="http://schemas.microsoft.com/office/drawing/2014/main" id="{B353AF21-E139-4933-9C8B-04A0BB1EF0F1}"/>
+                <a16:creationId xmlns="" xmlns:a16="http://schemas.microsoft.com/office/drawing/2014/main" id="{B353AF21-E139-4933-9C8B-04A0BB1EF0F1}"/>
               </a:ext>
             </a:extLst>
           </p:cNvPr>
@@ -2825,7 +2826,7 @@
           <p:cNvPr id="3" name="Text Placeholder 2">
             <a:extLst>
               <a:ext uri="{FF2B5EF4-FFF2-40B4-BE49-F238E27FC236}">
-                <a16:creationId xmlns:a16="http://schemas.microsoft.com/office/drawing/2014/main" id="{A5C422BB-DAE4-4E17-AFEE-552B495DE5B1}"/>
+                <a16:creationId xmlns="" xmlns:a16="http://schemas.microsoft.com/office/drawing/2014/main" id="{A5C422BB-DAE4-4E17-AFEE-552B495DE5B1}"/>
               </a:ext>
             </a:extLst>
           </p:cNvPr>
@@ -2893,7 +2894,7 @@
           <p:cNvPr id="4" name="Date Placeholder 3">
             <a:extLst>
               <a:ext uri="{FF2B5EF4-FFF2-40B4-BE49-F238E27FC236}">
-                <a16:creationId xmlns:a16="http://schemas.microsoft.com/office/drawing/2014/main" id="{11B057FE-19C5-43A6-B120-066BEF17D262}"/>
+                <a16:creationId xmlns="" xmlns:a16="http://schemas.microsoft.com/office/drawing/2014/main" id="{11B057FE-19C5-43A6-B120-066BEF17D262}"/>
               </a:ext>
             </a:extLst>
           </p:cNvPr>
@@ -2929,7 +2930,7 @@
           <a:p>
             <a:fld id="{2541EE3F-6AD4-4E8F-BC62-646164BF1E62}" type="datetimeFigureOut">
               <a:rPr lang="en-GB" smtClean="0"/>
-              <a:t>09/10/2017</a:t>
+              <a:t>10/10/2017</a:t>
             </a:fld>
             <a:endParaRPr lang="en-GB"/>
           </a:p>
@@ -2940,7 +2941,7 @@
           <p:cNvPr id="5" name="Footer Placeholder 4">
             <a:extLst>
               <a:ext uri="{FF2B5EF4-FFF2-40B4-BE49-F238E27FC236}">
-                <a16:creationId xmlns:a16="http://schemas.microsoft.com/office/drawing/2014/main" id="{976659F3-FF7A-48C1-8A21-F6C5A311E77A}"/>
+                <a16:creationId xmlns="" xmlns:a16="http://schemas.microsoft.com/office/drawing/2014/main" id="{976659F3-FF7A-48C1-8A21-F6C5A311E77A}"/>
               </a:ext>
             </a:extLst>
           </p:cNvPr>
@@ -2983,7 +2984,7 @@
           <p:cNvPr id="6" name="Slide Number Placeholder 5">
             <a:extLst>
               <a:ext uri="{FF2B5EF4-FFF2-40B4-BE49-F238E27FC236}">
-                <a16:creationId xmlns:a16="http://schemas.microsoft.com/office/drawing/2014/main" id="{5F382D8E-18F3-42DA-855C-77EDCCB5A564}"/>
+                <a16:creationId xmlns="" xmlns:a16="http://schemas.microsoft.com/office/drawing/2014/main" id="{5F382D8E-18F3-42DA-855C-77EDCCB5A564}"/>
               </a:ext>
             </a:extLst>
           </p:cNvPr>
@@ -3351,7 +3352,7 @@
           <p:cNvPr id="8" name="Rectangle 7">
             <a:extLst>
               <a:ext uri="{FF2B5EF4-FFF2-40B4-BE49-F238E27FC236}">
-                <a16:creationId xmlns:a16="http://schemas.microsoft.com/office/drawing/2014/main" id="{7C6BB0BD-5F91-4200-9297-8740A22379F2}"/>
+                <a16:creationId xmlns="" xmlns:a16="http://schemas.microsoft.com/office/drawing/2014/main" id="{7C6BB0BD-5F91-4200-9297-8740A22379F2}"/>
               </a:ext>
             </a:extLst>
           </p:cNvPr>
@@ -3404,7 +3405,7 @@
           <p:cNvPr id="7" name="Rectangle 6">
             <a:extLst>
               <a:ext uri="{FF2B5EF4-FFF2-40B4-BE49-F238E27FC236}">
-                <a16:creationId xmlns:a16="http://schemas.microsoft.com/office/drawing/2014/main" id="{368C36E8-9901-48EF-AC06-849E1D392F19}"/>
+                <a16:creationId xmlns="" xmlns:a16="http://schemas.microsoft.com/office/drawing/2014/main" id="{368C36E8-9901-48EF-AC06-849E1D392F19}"/>
               </a:ext>
             </a:extLst>
           </p:cNvPr>
@@ -3447,8 +3448,16 @@
           <a:p>
             <a:pPr algn="ctr"/>
             <a:r>
+              <a:rPr lang="en-GB" dirty="0" err="1" smtClean="0"/>
+              <a:t>myapp</a:t>
+            </a:r>
+            <a:r>
+              <a:rPr lang="en-GB" dirty="0" smtClean="0"/>
+              <a:t> </a:t>
+            </a:r>
+            <a:r>
               <a:rPr lang="en-GB" dirty="0"/>
-              <a:t>xxx (parent </a:t>
+              <a:t>(parent </a:t>
             </a:r>
             <a:r>
               <a:rPr lang="en-GB" dirty="0" err="1"/>
@@ -3466,7 +3475,7 @@
           <p:cNvPr id="4" name="Rectangle 3">
             <a:extLst>
               <a:ext uri="{FF2B5EF4-FFF2-40B4-BE49-F238E27FC236}">
-                <a16:creationId xmlns:a16="http://schemas.microsoft.com/office/drawing/2014/main" id="{E923CF28-C87A-4050-9F4B-32F709364FF7}"/>
+                <a16:creationId xmlns="" xmlns:a16="http://schemas.microsoft.com/office/drawing/2014/main" id="{E923CF28-C87A-4050-9F4B-32F709364FF7}"/>
               </a:ext>
             </a:extLst>
           </p:cNvPr>
@@ -3509,9 +3518,21 @@
           <a:p>
             <a:pPr algn="ctr"/>
             <a:r>
-              <a:rPr lang="en-GB" dirty="0"/>
-              <a:t>xxx-application</a:t>
-            </a:r>
+              <a:rPr lang="en-GB" dirty="0" err="1" smtClean="0"/>
+              <a:t>myapp</a:t>
+            </a:r>
+            <a:r>
+              <a:rPr lang="en-GB" dirty="0" smtClean="0"/>
+              <a:t>-</a:t>
+            </a:r>
+            <a:br>
+              <a:rPr lang="en-GB" dirty="0" smtClean="0"/>
+            </a:br>
+            <a:r>
+              <a:rPr lang="en-GB" dirty="0" smtClean="0"/>
+              <a:t>application</a:t>
+            </a:r>
+            <a:endParaRPr lang="en-GB" dirty="0"/>
           </a:p>
         </p:txBody>
       </p:sp>
@@ -3520,7 +3541,7 @@
           <p:cNvPr id="5" name="Rectangle 4">
             <a:extLst>
               <a:ext uri="{FF2B5EF4-FFF2-40B4-BE49-F238E27FC236}">
-                <a16:creationId xmlns:a16="http://schemas.microsoft.com/office/drawing/2014/main" id="{6AB0ECD5-AF2F-4E60-A4AF-1E89FFE47F43}"/>
+                <a16:creationId xmlns="" xmlns:a16="http://schemas.microsoft.com/office/drawing/2014/main" id="{6AB0ECD5-AF2F-4E60-A4AF-1E89FFE47F43}"/>
               </a:ext>
             </a:extLst>
           </p:cNvPr>
@@ -3563,9 +3584,21 @@
           <a:p>
             <a:pPr algn="ctr"/>
             <a:r>
-              <a:rPr lang="en-GB" dirty="0"/>
-              <a:t>xxx-module-simple</a:t>
-            </a:r>
+              <a:rPr lang="en-GB" dirty="0" err="1" smtClean="0"/>
+              <a:t>myapp</a:t>
+            </a:r>
+            <a:r>
+              <a:rPr lang="en-GB" dirty="0" smtClean="0"/>
+              <a:t>-</a:t>
+            </a:r>
+            <a:br>
+              <a:rPr lang="en-GB" dirty="0" smtClean="0"/>
+            </a:br>
+            <a:r>
+              <a:rPr lang="en-GB" dirty="0" smtClean="0"/>
+              <a:t>module-simple</a:t>
+            </a:r>
+            <a:endParaRPr lang="en-GB" dirty="0"/>
           </a:p>
         </p:txBody>
       </p:sp>
@@ -3574,7 +3607,7 @@
           <p:cNvPr id="6" name="Rectangle 5">
             <a:extLst>
               <a:ext uri="{FF2B5EF4-FFF2-40B4-BE49-F238E27FC236}">
-                <a16:creationId xmlns:a16="http://schemas.microsoft.com/office/drawing/2014/main" id="{903F2AA0-6C6F-4A72-8861-220AAE491733}"/>
+                <a16:creationId xmlns="" xmlns:a16="http://schemas.microsoft.com/office/drawing/2014/main" id="{903F2AA0-6C6F-4A72-8861-220AAE491733}"/>
               </a:ext>
             </a:extLst>
           </p:cNvPr>
@@ -3617,11 +3650,18 @@
           <a:p>
             <a:pPr algn="ctr"/>
             <a:r>
-              <a:rPr lang="en-GB" dirty="0"/>
-              <a:t>xxx-</a:t>
-            </a:r>
-            <a:r>
-              <a:rPr lang="en-GB" dirty="0" err="1"/>
+              <a:rPr lang="en-GB" dirty="0" err="1" smtClean="0"/>
+              <a:t>myapp</a:t>
+            </a:r>
+            <a:r>
+              <a:rPr lang="en-GB" dirty="0" smtClean="0"/>
+              <a:t>-</a:t>
+            </a:r>
+            <a:br>
+              <a:rPr lang="en-GB" dirty="0" smtClean="0"/>
+            </a:br>
+            <a:r>
+              <a:rPr lang="en-GB" dirty="0" smtClean="0"/>
               <a:t>webapp</a:t>
             </a:r>
             <a:endParaRPr lang="en-GB" dirty="0"/>
@@ -3633,7 +3673,7 @@
           <p:cNvPr id="9" name="TextBox 8">
             <a:extLst>
               <a:ext uri="{FF2B5EF4-FFF2-40B4-BE49-F238E27FC236}">
-                <a16:creationId xmlns:a16="http://schemas.microsoft.com/office/drawing/2014/main" id="{AF221787-E24D-406E-84B7-DA279BF91AAB}"/>
+                <a16:creationId xmlns="" xmlns:a16="http://schemas.microsoft.com/office/drawing/2014/main" id="{AF221787-E24D-406E-84B7-DA279BF91AAB}"/>
               </a:ext>
             </a:extLst>
           </p:cNvPr>
@@ -3673,7 +3713,7 @@
           <p:cNvPr id="10" name="TextBox 9">
             <a:extLst>
               <a:ext uri="{FF2B5EF4-FFF2-40B4-BE49-F238E27FC236}">
-                <a16:creationId xmlns:a16="http://schemas.microsoft.com/office/drawing/2014/main" id="{BA2F296B-AEEC-412A-ABB3-5B23EC6462E7}"/>
+                <a16:creationId xmlns="" xmlns:a16="http://schemas.microsoft.com/office/drawing/2014/main" id="{BA2F296B-AEEC-412A-ABB3-5B23EC6462E7}"/>
               </a:ext>
             </a:extLst>
           </p:cNvPr>
@@ -3708,7 +3748,7 @@
           <p:cNvPr id="12" name="Straight Arrow Connector 11">
             <a:extLst>
               <a:ext uri="{FF2B5EF4-FFF2-40B4-BE49-F238E27FC236}">
-                <a16:creationId xmlns:a16="http://schemas.microsoft.com/office/drawing/2014/main" id="{9CA1D782-73AD-4DD8-9C52-224809757839}"/>
+                <a16:creationId xmlns="" xmlns:a16="http://schemas.microsoft.com/office/drawing/2014/main" id="{9CA1D782-73AD-4DD8-9C52-224809757839}"/>
               </a:ext>
             </a:extLst>
           </p:cNvPr>
@@ -3754,7 +3794,7 @@
           <p:cNvPr id="13" name="TextBox 12">
             <a:extLst>
               <a:ext uri="{FF2B5EF4-FFF2-40B4-BE49-F238E27FC236}">
-                <a16:creationId xmlns:a16="http://schemas.microsoft.com/office/drawing/2014/main" id="{0CFF2AA2-4781-45F5-A2C6-1D86DEAB7266}"/>
+                <a16:creationId xmlns="" xmlns:a16="http://schemas.microsoft.com/office/drawing/2014/main" id="{0CFF2AA2-4781-45F5-A2C6-1D86DEAB7266}"/>
               </a:ext>
             </a:extLst>
           </p:cNvPr>
@@ -3763,7 +3803,7 @@
         </p:nvSpPr>
         <p:spPr>
           <a:xfrm>
-            <a:off x="4386648" y="1667417"/>
+            <a:off x="4386648" y="1642016"/>
             <a:ext cx="5390130" cy="923330"/>
           </a:xfrm>
           <a:prstGeom prst="rect">
@@ -3814,7 +3854,7 @@
           <p:cNvPr id="14" name="TextBox 13">
             <a:extLst>
               <a:ext uri="{FF2B5EF4-FFF2-40B4-BE49-F238E27FC236}">
-                <a16:creationId xmlns:a16="http://schemas.microsoft.com/office/drawing/2014/main" id="{5788EF02-1353-41D6-9FF8-C94C359562C1}"/>
+                <a16:creationId xmlns="" xmlns:a16="http://schemas.microsoft.com/office/drawing/2014/main" id="{5788EF02-1353-41D6-9FF8-C94C359562C1}"/>
               </a:ext>
             </a:extLst>
           </p:cNvPr>
@@ -3823,8 +3863,8 @@
         </p:nvSpPr>
         <p:spPr>
           <a:xfrm>
-            <a:off x="4386648" y="3092496"/>
-            <a:ext cx="5670142" cy="1200329"/>
+            <a:off x="4386648" y="3126364"/>
+            <a:ext cx="6462025" cy="1200329"/>
           </a:xfrm>
           <a:prstGeom prst="rect">
             <a:avLst/>
@@ -3838,8 +3878,8 @@
           <a:lstStyle/>
           <a:p>
             <a:r>
-              <a:rPr lang="en-GB" dirty="0" err="1"/>
-              <a:t>XxxAppManifest</a:t>
+              <a:rPr lang="en-GB" dirty="0" err="1" smtClean="0"/>
+              <a:t>DomainAppAppManifest</a:t>
             </a:r>
             <a:r>
               <a:rPr lang="en-GB" dirty="0"/>
@@ -3880,7 +3920,7 @@
           <p:cNvPr id="15" name="Straight Arrow Connector 14">
             <a:extLst>
               <a:ext uri="{FF2B5EF4-FFF2-40B4-BE49-F238E27FC236}">
-                <a16:creationId xmlns:a16="http://schemas.microsoft.com/office/drawing/2014/main" id="{5C34EC2E-57D4-4D05-A00F-87C157F1F716}"/>
+                <a16:creationId xmlns="" xmlns:a16="http://schemas.microsoft.com/office/drawing/2014/main" id="{5C34EC2E-57D4-4D05-A00F-87C157F1F716}"/>
               </a:ext>
             </a:extLst>
           </p:cNvPr>
@@ -3927,7 +3967,7 @@
           <p:cNvPr id="18" name="TextBox 17">
             <a:extLst>
               <a:ext uri="{FF2B5EF4-FFF2-40B4-BE49-F238E27FC236}">
-                <a16:creationId xmlns:a16="http://schemas.microsoft.com/office/drawing/2014/main" id="{4B3682B0-29AD-4652-A11A-DCF0476B3B3B}"/>
+                <a16:creationId xmlns="" xmlns:a16="http://schemas.microsoft.com/office/drawing/2014/main" id="{4B3682B0-29AD-4652-A11A-DCF0476B3B3B}"/>
               </a:ext>
             </a:extLst>
           </p:cNvPr>
@@ -3937,7 +3977,7 @@
         <p:spPr>
           <a:xfrm>
             <a:off x="4386648" y="4912333"/>
-            <a:ext cx="4248599" cy="1477328"/>
+            <a:ext cx="5922006" cy="1477328"/>
           </a:xfrm>
           <a:prstGeom prst="rect">
             <a:avLst/>
@@ -3966,8 +4006,16 @@
               <a:t> + </a:t>
             </a:r>
             <a:r>
-              <a:rPr lang="en-GB" dirty="0" err="1"/>
+              <a:rPr lang="en-GB" dirty="0" err="1" smtClean="0"/>
               <a:t>SimpleObjectRepository</a:t>
+            </a:r>
+            <a:r>
+              <a:rPr lang="en-GB" dirty="0" smtClean="0"/>
+              <a:t> + </a:t>
+            </a:r>
+            <a:r>
+              <a:rPr lang="en-GB" dirty="0" err="1" smtClean="0"/>
+              <a:t>SimpleObjectMenu</a:t>
             </a:r>
             <a:endParaRPr lang="en-GB" dirty="0"/>
           </a:p>
@@ -3999,6 +4047,743 @@
     <p:extLst>
       <p:ext uri="{BB962C8B-B14F-4D97-AF65-F5344CB8AC3E}">
         <p14:creationId xmlns:p14="http://schemas.microsoft.com/office/powerpoint/2010/main" val="2575838831"/>
+      </p:ext>
+    </p:extLst>
+  </p:cSld>
+  <p:clrMapOvr>
+    <a:masterClrMapping/>
+  </p:clrMapOvr>
+</p:sld>
+</file>
+
+<file path=ppt/slides/slide2.xml><?xml version="1.0" encoding="utf-8"?>
+<p:sld xmlns:a="http://schemas.openxmlformats.org/drawingml/2006/main" xmlns:r="http://schemas.openxmlformats.org/officeDocument/2006/relationships" xmlns:p="http://schemas.openxmlformats.org/presentationml/2006/main">
+  <p:cSld>
+    <p:spTree>
+      <p:nvGrpSpPr>
+        <p:cNvPr id="1" name=""/>
+        <p:cNvGrpSpPr/>
+        <p:nvPr/>
+      </p:nvGrpSpPr>
+      <p:grpSpPr>
+        <a:xfrm>
+          <a:off x="0" y="0"/>
+          <a:ext cx="0" cy="0"/>
+          <a:chOff x="0" y="0"/>
+          <a:chExt cx="0" cy="0"/>
+        </a:xfrm>
+      </p:grpSpPr>
+      <p:sp>
+        <p:nvSpPr>
+          <p:cNvPr id="8" name="Rectangle 7">
+            <a:extLst>
+              <a:ext uri="{FF2B5EF4-FFF2-40B4-BE49-F238E27FC236}">
+                <a16:creationId xmlns="" xmlns:a16="http://schemas.microsoft.com/office/drawing/2014/main" id="{7C6BB0BD-5F91-4200-9297-8740A22379F2}"/>
+              </a:ext>
+            </a:extLst>
+          </p:cNvPr>
+          <p:cNvSpPr/>
+          <p:nvPr/>
+        </p:nvSpPr>
+        <p:spPr>
+          <a:xfrm>
+            <a:off x="1776249" y="334374"/>
+            <a:ext cx="8239852" cy="6202350"/>
+          </a:xfrm>
+          <a:prstGeom prst="rect">
+            <a:avLst/>
+          </a:prstGeom>
+        </p:spPr>
+        <p:style>
+          <a:lnRef idx="2">
+            <a:schemeClr val="accent3">
+              <a:shade val="50000"/>
+            </a:schemeClr>
+          </a:lnRef>
+          <a:fillRef idx="1">
+            <a:schemeClr val="accent3"/>
+          </a:fillRef>
+          <a:effectRef idx="0">
+            <a:schemeClr val="accent3"/>
+          </a:effectRef>
+          <a:fontRef idx="minor">
+            <a:schemeClr val="lt1"/>
+          </a:fontRef>
+        </p:style>
+        <p:txBody>
+          <a:bodyPr rtlCol="0" anchor="t" anchorCtr="0"/>
+          <a:lstStyle/>
+          <a:p>
+            <a:pPr algn="ctr"/>
+            <a:r>
+              <a:rPr lang="en-GB" dirty="0" err="1"/>
+              <a:t>incode</a:t>
+            </a:r>
+            <a:r>
+              <a:rPr lang="en-GB" dirty="0"/>
+              <a:t>-build</a:t>
+            </a:r>
+          </a:p>
+        </p:txBody>
+      </p:sp>
+      <p:sp>
+        <p:nvSpPr>
+          <p:cNvPr id="7" name="Rectangle 6">
+            <a:extLst>
+              <a:ext uri="{FF2B5EF4-FFF2-40B4-BE49-F238E27FC236}">
+                <a16:creationId xmlns="" xmlns:a16="http://schemas.microsoft.com/office/drawing/2014/main" id="{368C36E8-9901-48EF-AC06-849E1D392F19}"/>
+              </a:ext>
+            </a:extLst>
+          </p:cNvPr>
+          <p:cNvSpPr/>
+          <p:nvPr/>
+        </p:nvSpPr>
+        <p:spPr>
+          <a:xfrm>
+            <a:off x="2055353" y="864972"/>
+            <a:ext cx="7698282" cy="5473129"/>
+          </a:xfrm>
+          <a:prstGeom prst="rect">
+            <a:avLst/>
+          </a:prstGeom>
+          <a:ln>
+            <a:solidFill>
+              <a:schemeClr val="bg2"/>
+            </a:solidFill>
+          </a:ln>
+        </p:spPr>
+        <p:style>
+          <a:lnRef idx="2">
+            <a:schemeClr val="accent5">
+              <a:shade val="50000"/>
+            </a:schemeClr>
+          </a:lnRef>
+          <a:fillRef idx="1">
+            <a:schemeClr val="accent5"/>
+          </a:fillRef>
+          <a:effectRef idx="0">
+            <a:schemeClr val="accent5"/>
+          </a:effectRef>
+          <a:fontRef idx="minor">
+            <a:schemeClr val="lt1"/>
+          </a:fontRef>
+        </p:style>
+        <p:txBody>
+          <a:bodyPr rtlCol="0" anchor="t" anchorCtr="0"/>
+          <a:lstStyle/>
+          <a:p>
+            <a:pPr algn="ctr"/>
+            <a:r>
+              <a:rPr lang="en-GB" dirty="0" err="1" smtClean="0"/>
+              <a:t>myapp</a:t>
+            </a:r>
+            <a:r>
+              <a:rPr lang="en-GB" dirty="0" smtClean="0"/>
+              <a:t> </a:t>
+            </a:r>
+            <a:r>
+              <a:rPr lang="en-GB" dirty="0"/>
+              <a:t>(parent </a:t>
+            </a:r>
+            <a:r>
+              <a:rPr lang="en-GB" dirty="0" err="1"/>
+              <a:t>pom</a:t>
+            </a:r>
+            <a:r>
+              <a:rPr lang="en-GB" dirty="0"/>
+              <a:t>)</a:t>
+            </a:r>
+          </a:p>
+        </p:txBody>
+      </p:sp>
+      <p:sp>
+        <p:nvSpPr>
+          <p:cNvPr id="4" name="Rectangle 3">
+            <a:extLst>
+              <a:ext uri="{FF2B5EF4-FFF2-40B4-BE49-F238E27FC236}">
+                <a16:creationId xmlns="" xmlns:a16="http://schemas.microsoft.com/office/drawing/2014/main" id="{E923CF28-C87A-4050-9F4B-32F709364FF7}"/>
+              </a:ext>
+            </a:extLst>
+          </p:cNvPr>
+          <p:cNvSpPr/>
+          <p:nvPr/>
+        </p:nvSpPr>
+        <p:spPr>
+          <a:xfrm>
+            <a:off x="4828423" y="2762464"/>
+            <a:ext cx="2047461" cy="920751"/>
+          </a:xfrm>
+          <a:prstGeom prst="rect">
+            <a:avLst/>
+          </a:prstGeom>
+          <a:ln>
+            <a:solidFill>
+              <a:schemeClr val="bg2"/>
+            </a:solidFill>
+          </a:ln>
+        </p:spPr>
+        <p:style>
+          <a:lnRef idx="2">
+            <a:schemeClr val="accent2">
+              <a:shade val="50000"/>
+            </a:schemeClr>
+          </a:lnRef>
+          <a:fillRef idx="1">
+            <a:schemeClr val="accent2"/>
+          </a:fillRef>
+          <a:effectRef idx="0">
+            <a:schemeClr val="accent2"/>
+          </a:effectRef>
+          <a:fontRef idx="minor">
+            <a:schemeClr val="lt1"/>
+          </a:fontRef>
+        </p:style>
+        <p:txBody>
+          <a:bodyPr rtlCol="0" anchor="ctr"/>
+          <a:lstStyle/>
+          <a:p>
+            <a:pPr algn="ctr"/>
+            <a:r>
+              <a:rPr lang="en-GB" dirty="0" err="1" smtClean="0"/>
+              <a:t>myapp</a:t>
+            </a:r>
+            <a:r>
+              <a:rPr lang="en-GB" dirty="0" smtClean="0"/>
+              <a:t>-</a:t>
+            </a:r>
+            <a:br>
+              <a:rPr lang="en-GB" dirty="0" smtClean="0"/>
+            </a:br>
+            <a:r>
+              <a:rPr lang="en-GB" dirty="0" smtClean="0"/>
+              <a:t>application</a:t>
+            </a:r>
+            <a:endParaRPr lang="en-GB" dirty="0"/>
+          </a:p>
+        </p:txBody>
+      </p:sp>
+      <p:sp>
+        <p:nvSpPr>
+          <p:cNvPr id="5" name="Rectangle 4">
+            <a:extLst>
+              <a:ext uri="{FF2B5EF4-FFF2-40B4-BE49-F238E27FC236}">
+                <a16:creationId xmlns="" xmlns:a16="http://schemas.microsoft.com/office/drawing/2014/main" id="{6AB0ECD5-AF2F-4E60-A4AF-1E89FFE47F43}"/>
+              </a:ext>
+            </a:extLst>
+          </p:cNvPr>
+          <p:cNvSpPr/>
+          <p:nvPr/>
+        </p:nvSpPr>
+        <p:spPr>
+          <a:xfrm>
+            <a:off x="2396104" y="5181599"/>
+            <a:ext cx="2047461" cy="920751"/>
+          </a:xfrm>
+          <a:prstGeom prst="rect">
+            <a:avLst/>
+          </a:prstGeom>
+          <a:ln>
+            <a:solidFill>
+              <a:schemeClr val="bg2"/>
+            </a:solidFill>
+          </a:ln>
+        </p:spPr>
+        <p:style>
+          <a:lnRef idx="2">
+            <a:schemeClr val="accent6">
+              <a:shade val="50000"/>
+            </a:schemeClr>
+          </a:lnRef>
+          <a:fillRef idx="1">
+            <a:schemeClr val="accent6"/>
+          </a:fillRef>
+          <a:effectRef idx="0">
+            <a:schemeClr val="accent6"/>
+          </a:effectRef>
+          <a:fontRef idx="minor">
+            <a:schemeClr val="lt1"/>
+          </a:fontRef>
+        </p:style>
+        <p:txBody>
+          <a:bodyPr rtlCol="0" anchor="ctr"/>
+          <a:lstStyle/>
+          <a:p>
+            <a:pPr algn="ctr"/>
+            <a:r>
+              <a:rPr lang="en-GB" dirty="0" err="1" smtClean="0"/>
+              <a:t>myapp</a:t>
+            </a:r>
+            <a:r>
+              <a:rPr lang="en-GB" dirty="0" smtClean="0"/>
+              <a:t>-</a:t>
+            </a:r>
+            <a:br>
+              <a:rPr lang="en-GB" dirty="0" smtClean="0"/>
+            </a:br>
+            <a:r>
+              <a:rPr lang="en-GB" dirty="0" smtClean="0"/>
+              <a:t>module-customer</a:t>
+            </a:r>
+            <a:endParaRPr lang="en-GB" dirty="0"/>
+          </a:p>
+        </p:txBody>
+      </p:sp>
+      <p:sp>
+        <p:nvSpPr>
+          <p:cNvPr id="6" name="Rectangle 5">
+            <a:extLst>
+              <a:ext uri="{FF2B5EF4-FFF2-40B4-BE49-F238E27FC236}">
+                <a16:creationId xmlns="" xmlns:a16="http://schemas.microsoft.com/office/drawing/2014/main" id="{903F2AA0-6C6F-4A72-8861-220AAE491733}"/>
+              </a:ext>
+            </a:extLst>
+          </p:cNvPr>
+          <p:cNvSpPr/>
+          <p:nvPr/>
+        </p:nvSpPr>
+        <p:spPr>
+          <a:xfrm>
+            <a:off x="4842971" y="1457720"/>
+            <a:ext cx="2047461" cy="920751"/>
+          </a:xfrm>
+          <a:prstGeom prst="rect">
+            <a:avLst/>
+          </a:prstGeom>
+          <a:ln>
+            <a:solidFill>
+              <a:schemeClr val="bg2"/>
+            </a:solidFill>
+          </a:ln>
+        </p:spPr>
+        <p:style>
+          <a:lnRef idx="2">
+            <a:schemeClr val="accent1">
+              <a:shade val="50000"/>
+            </a:schemeClr>
+          </a:lnRef>
+          <a:fillRef idx="1">
+            <a:schemeClr val="accent1"/>
+          </a:fillRef>
+          <a:effectRef idx="0">
+            <a:schemeClr val="accent1"/>
+          </a:effectRef>
+          <a:fontRef idx="minor">
+            <a:schemeClr val="lt1"/>
+          </a:fontRef>
+        </p:style>
+        <p:txBody>
+          <a:bodyPr rtlCol="0" anchor="ctr"/>
+          <a:lstStyle/>
+          <a:p>
+            <a:pPr algn="ctr"/>
+            <a:r>
+              <a:rPr lang="en-GB" dirty="0" err="1" smtClean="0"/>
+              <a:t>myapp</a:t>
+            </a:r>
+            <a:r>
+              <a:rPr lang="en-GB" dirty="0" smtClean="0"/>
+              <a:t>-</a:t>
+            </a:r>
+            <a:br>
+              <a:rPr lang="en-GB" dirty="0" smtClean="0"/>
+            </a:br>
+            <a:r>
+              <a:rPr lang="en-GB" dirty="0" smtClean="0"/>
+              <a:t>webapp</a:t>
+            </a:r>
+            <a:endParaRPr lang="en-GB" dirty="0"/>
+          </a:p>
+        </p:txBody>
+      </p:sp>
+      <p:cxnSp>
+        <p:nvCxnSpPr>
+          <p:cNvPr id="12" name="Straight Arrow Connector 11">
+            <a:extLst>
+              <a:ext uri="{FF2B5EF4-FFF2-40B4-BE49-F238E27FC236}">
+                <a16:creationId xmlns="" xmlns:a16="http://schemas.microsoft.com/office/drawing/2014/main" id="{9CA1D782-73AD-4DD8-9C52-224809757839}"/>
+              </a:ext>
+            </a:extLst>
+          </p:cNvPr>
+          <p:cNvCxnSpPr>
+            <a:stCxn id="6" idx="2"/>
+            <a:endCxn id="4" idx="0"/>
+          </p:cNvCxnSpPr>
+          <p:nvPr/>
+        </p:nvCxnSpPr>
+        <p:spPr>
+          <a:xfrm flipH="1">
+            <a:off x="5852154" y="2378471"/>
+            <a:ext cx="14548" cy="383993"/>
+          </a:xfrm>
+          <a:prstGeom prst="straightConnector1">
+            <a:avLst/>
+          </a:prstGeom>
+          <a:ln w="19050">
+            <a:solidFill>
+              <a:schemeClr val="bg2"/>
+            </a:solidFill>
+            <a:prstDash val="dash"/>
+            <a:tailEnd type="arrow"/>
+          </a:ln>
+        </p:spPr>
+        <p:style>
+          <a:lnRef idx="1">
+            <a:schemeClr val="accent1"/>
+          </a:lnRef>
+          <a:fillRef idx="0">
+            <a:schemeClr val="accent1"/>
+          </a:fillRef>
+          <a:effectRef idx="0">
+            <a:schemeClr val="accent1"/>
+          </a:effectRef>
+          <a:fontRef idx="minor">
+            <a:schemeClr val="tx1"/>
+          </a:fontRef>
+        </p:style>
+      </p:cxnSp>
+      <p:sp>
+        <p:nvSpPr>
+          <p:cNvPr id="16" name="Rectangle 15">
+            <a:extLst>
+              <a:ext uri="{FF2B5EF4-FFF2-40B4-BE49-F238E27FC236}">
+                <a16:creationId xmlns="" xmlns:a16="http://schemas.microsoft.com/office/drawing/2014/main" id="{6AB0ECD5-AF2F-4E60-A4AF-1E89FFE47F43}"/>
+              </a:ext>
+            </a:extLst>
+          </p:cNvPr>
+          <p:cNvSpPr/>
+          <p:nvPr/>
+        </p:nvSpPr>
+        <p:spPr>
+          <a:xfrm>
+            <a:off x="7357571" y="5181600"/>
+            <a:ext cx="2047461" cy="920751"/>
+          </a:xfrm>
+          <a:prstGeom prst="rect">
+            <a:avLst/>
+          </a:prstGeom>
+          <a:ln>
+            <a:solidFill>
+              <a:schemeClr val="bg2"/>
+            </a:solidFill>
+          </a:ln>
+        </p:spPr>
+        <p:style>
+          <a:lnRef idx="2">
+            <a:schemeClr val="accent6">
+              <a:shade val="50000"/>
+            </a:schemeClr>
+          </a:lnRef>
+          <a:fillRef idx="1">
+            <a:schemeClr val="accent6"/>
+          </a:fillRef>
+          <a:effectRef idx="0">
+            <a:schemeClr val="accent6"/>
+          </a:effectRef>
+          <a:fontRef idx="minor">
+            <a:schemeClr val="lt1"/>
+          </a:fontRef>
+        </p:style>
+        <p:txBody>
+          <a:bodyPr rtlCol="0" anchor="ctr"/>
+          <a:lstStyle/>
+          <a:p>
+            <a:pPr algn="ctr"/>
+            <a:r>
+              <a:rPr lang="en-GB" dirty="0" err="1" smtClean="0"/>
+              <a:t>myapp</a:t>
+            </a:r>
+            <a:r>
+              <a:rPr lang="en-GB" dirty="0" smtClean="0"/>
+              <a:t>-</a:t>
+            </a:r>
+            <a:br>
+              <a:rPr lang="en-GB" dirty="0" smtClean="0"/>
+            </a:br>
+            <a:r>
+              <a:rPr lang="en-GB" dirty="0" smtClean="0"/>
+              <a:t>module-product</a:t>
+            </a:r>
+            <a:endParaRPr lang="en-GB" dirty="0"/>
+          </a:p>
+        </p:txBody>
+      </p:sp>
+      <p:sp>
+        <p:nvSpPr>
+          <p:cNvPr id="19" name="Rectangle 18">
+            <a:extLst>
+              <a:ext uri="{FF2B5EF4-FFF2-40B4-BE49-F238E27FC236}">
+                <a16:creationId xmlns="" xmlns:a16="http://schemas.microsoft.com/office/drawing/2014/main" id="{6AB0ECD5-AF2F-4E60-A4AF-1E89FFE47F43}"/>
+              </a:ext>
+            </a:extLst>
+          </p:cNvPr>
+          <p:cNvSpPr/>
+          <p:nvPr/>
+        </p:nvSpPr>
+        <p:spPr>
+          <a:xfrm>
+            <a:off x="4842971" y="4160389"/>
+            <a:ext cx="2047461" cy="920751"/>
+          </a:xfrm>
+          <a:prstGeom prst="rect">
+            <a:avLst/>
+          </a:prstGeom>
+          <a:ln>
+            <a:solidFill>
+              <a:schemeClr val="bg2"/>
+            </a:solidFill>
+          </a:ln>
+        </p:spPr>
+        <p:style>
+          <a:lnRef idx="2">
+            <a:schemeClr val="accent6">
+              <a:shade val="50000"/>
+            </a:schemeClr>
+          </a:lnRef>
+          <a:fillRef idx="1">
+            <a:schemeClr val="accent6"/>
+          </a:fillRef>
+          <a:effectRef idx="0">
+            <a:schemeClr val="accent6"/>
+          </a:effectRef>
+          <a:fontRef idx="minor">
+            <a:schemeClr val="lt1"/>
+          </a:fontRef>
+        </p:style>
+        <p:txBody>
+          <a:bodyPr rtlCol="0" anchor="ctr"/>
+          <a:lstStyle/>
+          <a:p>
+            <a:pPr algn="ctr"/>
+            <a:r>
+              <a:rPr lang="en-GB" dirty="0" err="1" smtClean="0"/>
+              <a:t>myapp</a:t>
+            </a:r>
+            <a:r>
+              <a:rPr lang="en-GB" dirty="0" smtClean="0"/>
+              <a:t>-</a:t>
+            </a:r>
+            <a:br>
+              <a:rPr lang="en-GB" dirty="0" smtClean="0"/>
+            </a:br>
+            <a:r>
+              <a:rPr lang="en-GB" dirty="0" smtClean="0"/>
+              <a:t>module-order</a:t>
+            </a:r>
+            <a:endParaRPr lang="en-GB" dirty="0"/>
+          </a:p>
+        </p:txBody>
+      </p:sp>
+      <p:cxnSp>
+        <p:nvCxnSpPr>
+          <p:cNvPr id="32" name="Elbow Connector 31"/>
+          <p:cNvCxnSpPr>
+            <a:stCxn id="4" idx="2"/>
+            <a:endCxn id="19" idx="0"/>
+          </p:cNvCxnSpPr>
+          <p:nvPr/>
+        </p:nvCxnSpPr>
+        <p:spPr>
+          <a:xfrm rot="16200000" flipH="1">
+            <a:off x="5620841" y="3914528"/>
+            <a:ext cx="477174" cy="14548"/>
+          </a:xfrm>
+          <a:prstGeom prst="bentConnector3">
+            <a:avLst/>
+          </a:prstGeom>
+          <a:ln w="19050">
+            <a:solidFill>
+              <a:schemeClr val="bg2"/>
+            </a:solidFill>
+            <a:prstDash val="dash"/>
+            <a:tailEnd type="arrow"/>
+          </a:ln>
+        </p:spPr>
+        <p:style>
+          <a:lnRef idx="1">
+            <a:schemeClr val="accent1"/>
+          </a:lnRef>
+          <a:fillRef idx="0">
+            <a:schemeClr val="accent1"/>
+          </a:fillRef>
+          <a:effectRef idx="0">
+            <a:schemeClr val="accent1"/>
+          </a:effectRef>
+          <a:fontRef idx="minor">
+            <a:schemeClr val="tx1"/>
+          </a:fontRef>
+        </p:style>
+      </p:cxnSp>
+      <p:cxnSp>
+        <p:nvCxnSpPr>
+          <p:cNvPr id="34" name="Elbow Connector 33"/>
+          <p:cNvCxnSpPr>
+            <a:stCxn id="4" idx="2"/>
+            <a:endCxn id="5" idx="0"/>
+          </p:cNvCxnSpPr>
+          <p:nvPr/>
+        </p:nvCxnSpPr>
+        <p:spPr>
+          <a:xfrm rot="5400000">
+            <a:off x="3886803" y="3216248"/>
+            <a:ext cx="1498384" cy="2432319"/>
+          </a:xfrm>
+          <a:prstGeom prst="bentConnector3">
+            <a:avLst>
+              <a:gd name="adj1" fmla="val 15532"/>
+            </a:avLst>
+          </a:prstGeom>
+          <a:ln w="19050">
+            <a:solidFill>
+              <a:schemeClr val="bg2"/>
+            </a:solidFill>
+            <a:prstDash val="dash"/>
+            <a:tailEnd type="arrow"/>
+          </a:ln>
+        </p:spPr>
+        <p:style>
+          <a:lnRef idx="1">
+            <a:schemeClr val="accent1"/>
+          </a:lnRef>
+          <a:fillRef idx="0">
+            <a:schemeClr val="accent1"/>
+          </a:fillRef>
+          <a:effectRef idx="0">
+            <a:schemeClr val="accent1"/>
+          </a:effectRef>
+          <a:fontRef idx="minor">
+            <a:schemeClr val="tx1"/>
+          </a:fontRef>
+        </p:style>
+      </p:cxnSp>
+      <p:cxnSp>
+        <p:nvCxnSpPr>
+          <p:cNvPr id="38" name="Elbow Connector 37"/>
+          <p:cNvCxnSpPr>
+            <a:stCxn id="4" idx="2"/>
+            <a:endCxn id="16" idx="0"/>
+          </p:cNvCxnSpPr>
+          <p:nvPr/>
+        </p:nvCxnSpPr>
+        <p:spPr>
+          <a:xfrm rot="16200000" flipH="1">
+            <a:off x="6367536" y="3167833"/>
+            <a:ext cx="1498385" cy="2529148"/>
+          </a:xfrm>
+          <a:prstGeom prst="bentConnector3">
+            <a:avLst>
+              <a:gd name="adj1" fmla="val 14967"/>
+            </a:avLst>
+          </a:prstGeom>
+          <a:ln w="19050">
+            <a:solidFill>
+              <a:schemeClr val="bg2"/>
+            </a:solidFill>
+            <a:prstDash val="dash"/>
+            <a:tailEnd type="arrow"/>
+          </a:ln>
+        </p:spPr>
+        <p:style>
+          <a:lnRef idx="1">
+            <a:schemeClr val="accent1"/>
+          </a:lnRef>
+          <a:fillRef idx="0">
+            <a:schemeClr val="accent1"/>
+          </a:fillRef>
+          <a:effectRef idx="0">
+            <a:schemeClr val="accent1"/>
+          </a:effectRef>
+          <a:fontRef idx="minor">
+            <a:schemeClr val="tx1"/>
+          </a:fontRef>
+        </p:style>
+      </p:cxnSp>
+      <p:cxnSp>
+        <p:nvCxnSpPr>
+          <p:cNvPr id="50" name="Elbow Connector 49"/>
+          <p:cNvCxnSpPr>
+            <a:stCxn id="19" idx="3"/>
+            <a:endCxn id="16" idx="1"/>
+          </p:cNvCxnSpPr>
+          <p:nvPr/>
+        </p:nvCxnSpPr>
+        <p:spPr>
+          <a:xfrm>
+            <a:off x="6890432" y="4620765"/>
+            <a:ext cx="467139" cy="1021211"/>
+          </a:xfrm>
+          <a:prstGeom prst="bentConnector3">
+            <a:avLst>
+              <a:gd name="adj1" fmla="val 50000"/>
+            </a:avLst>
+          </a:prstGeom>
+          <a:ln w="19050">
+            <a:solidFill>
+              <a:schemeClr val="bg2"/>
+            </a:solidFill>
+            <a:prstDash val="dash"/>
+            <a:tailEnd type="arrow"/>
+          </a:ln>
+        </p:spPr>
+        <p:style>
+          <a:lnRef idx="1">
+            <a:schemeClr val="accent1"/>
+          </a:lnRef>
+          <a:fillRef idx="0">
+            <a:schemeClr val="accent1"/>
+          </a:fillRef>
+          <a:effectRef idx="0">
+            <a:schemeClr val="accent1"/>
+          </a:effectRef>
+          <a:fontRef idx="minor">
+            <a:schemeClr val="tx1"/>
+          </a:fontRef>
+        </p:style>
+      </p:cxnSp>
+      <p:cxnSp>
+        <p:nvCxnSpPr>
+          <p:cNvPr id="53" name="Elbow Connector 52"/>
+          <p:cNvCxnSpPr>
+            <a:stCxn id="19" idx="1"/>
+            <a:endCxn id="5" idx="3"/>
+          </p:cNvCxnSpPr>
+          <p:nvPr/>
+        </p:nvCxnSpPr>
+        <p:spPr>
+          <a:xfrm rot="10800000" flipV="1">
+            <a:off x="4443565" y="4620765"/>
+            <a:ext cx="399406" cy="1021210"/>
+          </a:xfrm>
+          <a:prstGeom prst="bentConnector3">
+            <a:avLst>
+              <a:gd name="adj1" fmla="val 50000"/>
+            </a:avLst>
+          </a:prstGeom>
+          <a:ln w="19050">
+            <a:solidFill>
+              <a:schemeClr val="bg2"/>
+            </a:solidFill>
+            <a:prstDash val="dash"/>
+            <a:tailEnd type="arrow"/>
+          </a:ln>
+        </p:spPr>
+        <p:style>
+          <a:lnRef idx="1">
+            <a:schemeClr val="accent1"/>
+          </a:lnRef>
+          <a:fillRef idx="0">
+            <a:schemeClr val="accent1"/>
+          </a:fillRef>
+          <a:effectRef idx="0">
+            <a:schemeClr val="accent1"/>
+          </a:effectRef>
+          <a:fontRef idx="minor">
+            <a:schemeClr val="tx1"/>
+          </a:fontRef>
+        </p:style>
+      </p:cxnSp>
+    </p:spTree>
+    <p:extLst>
+      <p:ext uri="{BB962C8B-B14F-4D97-AF65-F5344CB8AC3E}">
+        <p14:creationId xmlns:p14="http://schemas.microsoft.com/office/powerpoint/2010/main" val="2358933293"/>
       </p:ext>
     </p:extLst>
   </p:cSld>
@@ -4297,7 +5082,7 @@
   <a:extraClrSchemeLst/>
   <a:extLst>
     <a:ext uri="{05A4C25C-085E-4340-85A3-A5531E510DB2}">
-      <thm15:themeFamily xmlns:thm15="http://schemas.microsoft.com/office/thememl/2012/main" name="Office Theme" id="{62F939B6-93AF-4DB8-9C6B-D6C7DFDC589F}" vid="{4A3C46E8-61CC-4603-A589-7422A47A8E4A}"/>
+      <thm15:themeFamily xmlns="" xmlns:thm15="http://schemas.microsoft.com/office/thememl/2012/main" name="Office Theme" id="{62F939B6-93AF-4DB8-9C6B-D6C7DFDC589F}" vid="{4A3C46E8-61CC-4603-A589-7422A47A8E4A}"/>
     </a:ext>
   </a:extLst>
 </a:theme>

</xml_diff>